<commit_message>
add performance 0614 excel
</commit_message>
<xml_diff>
--- a/DeepM6A/presentation/DeepM6A_meth.pptx
+++ b/DeepM6A/presentation/DeepM6A_meth.pptx
@@ -295,7 +295,7 @@
           <a:p>
             <a:fld id="{BA0850F6-1F4F-4167-94CC-452D8DCE8FB8}" type="datetimeFigureOut">
               <a:rPr lang="zh-TW" altLang="en-US" smtClean="0"/>
-              <a:t>2022/6/13</a:t>
+              <a:t>2022/6/14</a:t>
             </a:fld>
             <a:endParaRPr lang="zh-TW" altLang="en-US"/>
           </a:p>
@@ -493,7 +493,7 @@
           <a:p>
             <a:fld id="{BA0850F6-1F4F-4167-94CC-452D8DCE8FB8}" type="datetimeFigureOut">
               <a:rPr lang="zh-TW" altLang="en-US" smtClean="0"/>
-              <a:t>2022/6/13</a:t>
+              <a:t>2022/6/14</a:t>
             </a:fld>
             <a:endParaRPr lang="zh-TW" altLang="en-US"/>
           </a:p>
@@ -701,7 +701,7 @@
           <a:p>
             <a:fld id="{BA0850F6-1F4F-4167-94CC-452D8DCE8FB8}" type="datetimeFigureOut">
               <a:rPr lang="zh-TW" altLang="en-US" smtClean="0"/>
-              <a:t>2022/6/13</a:t>
+              <a:t>2022/6/14</a:t>
             </a:fld>
             <a:endParaRPr lang="zh-TW" altLang="en-US"/>
           </a:p>
@@ -899,7 +899,7 @@
           <a:p>
             <a:fld id="{BA0850F6-1F4F-4167-94CC-452D8DCE8FB8}" type="datetimeFigureOut">
               <a:rPr lang="zh-TW" altLang="en-US" smtClean="0"/>
-              <a:t>2022/6/13</a:t>
+              <a:t>2022/6/14</a:t>
             </a:fld>
             <a:endParaRPr lang="zh-TW" altLang="en-US"/>
           </a:p>
@@ -1174,7 +1174,7 @@
           <a:p>
             <a:fld id="{BA0850F6-1F4F-4167-94CC-452D8DCE8FB8}" type="datetimeFigureOut">
               <a:rPr lang="zh-TW" altLang="en-US" smtClean="0"/>
-              <a:t>2022/6/13</a:t>
+              <a:t>2022/6/14</a:t>
             </a:fld>
             <a:endParaRPr lang="zh-TW" altLang="en-US"/>
           </a:p>
@@ -1439,7 +1439,7 @@
           <a:p>
             <a:fld id="{BA0850F6-1F4F-4167-94CC-452D8DCE8FB8}" type="datetimeFigureOut">
               <a:rPr lang="zh-TW" altLang="en-US" smtClean="0"/>
-              <a:t>2022/6/13</a:t>
+              <a:t>2022/6/14</a:t>
             </a:fld>
             <a:endParaRPr lang="zh-TW" altLang="en-US"/>
           </a:p>
@@ -1851,7 +1851,7 @@
           <a:p>
             <a:fld id="{BA0850F6-1F4F-4167-94CC-452D8DCE8FB8}" type="datetimeFigureOut">
               <a:rPr lang="zh-TW" altLang="en-US" smtClean="0"/>
-              <a:t>2022/6/13</a:t>
+              <a:t>2022/6/14</a:t>
             </a:fld>
             <a:endParaRPr lang="zh-TW" altLang="en-US"/>
           </a:p>
@@ -1992,7 +1992,7 @@
           <a:p>
             <a:fld id="{BA0850F6-1F4F-4167-94CC-452D8DCE8FB8}" type="datetimeFigureOut">
               <a:rPr lang="zh-TW" altLang="en-US" smtClean="0"/>
-              <a:t>2022/6/13</a:t>
+              <a:t>2022/6/14</a:t>
             </a:fld>
             <a:endParaRPr lang="zh-TW" altLang="en-US"/>
           </a:p>
@@ -2105,7 +2105,7 @@
           <a:p>
             <a:fld id="{BA0850F6-1F4F-4167-94CC-452D8DCE8FB8}" type="datetimeFigureOut">
               <a:rPr lang="zh-TW" altLang="en-US" smtClean="0"/>
-              <a:t>2022/6/13</a:t>
+              <a:t>2022/6/14</a:t>
             </a:fld>
             <a:endParaRPr lang="zh-TW" altLang="en-US"/>
           </a:p>
@@ -2416,7 +2416,7 @@
           <a:p>
             <a:fld id="{BA0850F6-1F4F-4167-94CC-452D8DCE8FB8}" type="datetimeFigureOut">
               <a:rPr lang="zh-TW" altLang="en-US" smtClean="0"/>
-              <a:t>2022/6/13</a:t>
+              <a:t>2022/6/14</a:t>
             </a:fld>
             <a:endParaRPr lang="zh-TW" altLang="en-US"/>
           </a:p>
@@ -2704,7 +2704,7 @@
           <a:p>
             <a:fld id="{BA0850F6-1F4F-4167-94CC-452D8DCE8FB8}" type="datetimeFigureOut">
               <a:rPr lang="zh-TW" altLang="en-US" smtClean="0"/>
-              <a:t>2022/6/13</a:t>
+              <a:t>2022/6/14</a:t>
             </a:fld>
             <a:endParaRPr lang="zh-TW" altLang="en-US"/>
           </a:p>
@@ -2945,7 +2945,7 @@
           <a:p>
             <a:fld id="{BA0850F6-1F4F-4167-94CC-452D8DCE8FB8}" type="datetimeFigureOut">
               <a:rPr lang="zh-TW" altLang="en-US" smtClean="0"/>
-              <a:t>2022/6/13</a:t>
+              <a:t>2022/6/14</a:t>
             </a:fld>
             <a:endParaRPr lang="zh-TW" altLang="en-US"/>
           </a:p>

</xml_diff>